<commit_message>
added warmup exercise update
</commit_message>
<xml_diff>
--- a/002_Course_Exercises/01_CS120_Warmup_Exercises.pptx
+++ b/002_Course_Exercises/01_CS120_Warmup_Exercises.pptx
@@ -2564,8 +2564,8 @@
         </p:nvSpPr>
         <p:spPr>
           <a:xfrm>
-            <a:off x="2516254" y="166279"/>
-            <a:ext cx="4111492" cy="572700"/>
+            <a:off x="281335" y="383241"/>
+            <a:ext cx="7704000" cy="572700"/>
           </a:xfrm>
           <a:prstGeom prst="rect">
             <a:avLst/>
@@ -2587,7 +2587,7 @@
               <a:buNone/>
             </a:pPr>
             <a:r>
-              <a:rPr lang="en-CA" sz="2400" dirty="0">
+              <a:rPr lang="en-CA" sz="3200" dirty="0">
                 <a:solidFill>
                   <a:schemeClr val="hlink"/>
                 </a:solidFill>
@@ -2599,7 +2599,322 @@
                 <a:cs typeface="Anton"/>
                 <a:sym typeface="Anton"/>
               </a:rPr>
-              <a:t>Java Warm-Up Coding Exercises</a:t>
+              <a:t>#1 Coding Warm-Up: Loops &amp; Logic</a:t>
+            </a:r>
+            <a:endParaRPr lang="en-CA" sz="3200" dirty="0">
+              <a:solidFill>
+                <a:schemeClr val="dk1"/>
+              </a:solidFill>
+              <a:latin typeface="Anton"/>
+              <a:ea typeface="Anton"/>
+              <a:cs typeface="Anton"/>
+              <a:sym typeface="Anton"/>
+            </a:endParaRPr>
+          </a:p>
+        </p:txBody>
+      </p:sp>
+      <p:sp>
+        <p:nvSpPr>
+          <p:cNvPr id="3" name="TextBox 2">
+            <a:extLst>
+              <a:ext uri="{FF2B5EF4-FFF2-40B4-BE49-F238E27FC236}">
+                <a16:creationId xmlns:a16="http://schemas.microsoft.com/office/drawing/2014/main" id="{CE5790DA-742D-961A-C38F-E6DA2F4E3CD8}"/>
+              </a:ext>
+            </a:extLst>
+          </p:cNvPr>
+          <p:cNvSpPr txBox="1"/>
+          <p:nvPr/>
+        </p:nvSpPr>
+        <p:spPr>
+          <a:xfrm>
+            <a:off x="281335" y="1186755"/>
+            <a:ext cx="8297562" cy="2031325"/>
+          </a:xfrm>
+          <a:prstGeom prst="rect">
+            <a:avLst/>
+          </a:prstGeom>
+          <a:noFill/>
+        </p:spPr>
+        <p:txBody>
+          <a:bodyPr wrap="square">
+            <a:spAutoFit/>
+          </a:bodyPr>
+          <a:lstStyle/>
+          <a:p>
+            <a:r>
+              <a:rPr lang="en-US" b="0" dirty="0">
+                <a:solidFill>
+                  <a:srgbClr val="6A9955"/>
+                </a:solidFill>
+                <a:effectLst/>
+                <a:latin typeface="Consolas" panose="020B0609020204030204" pitchFamily="49" charset="0"/>
+              </a:rPr>
+              <a:t>//Write a </a:t>
+            </a:r>
+            <a:r>
+              <a:rPr lang="en-US" dirty="0">
+                <a:solidFill>
+                  <a:srgbClr val="6A9955"/>
+                </a:solidFill>
+                <a:latin typeface="Consolas" panose="020B0609020204030204" pitchFamily="49" charset="0"/>
+              </a:rPr>
+              <a:t>java</a:t>
+            </a:r>
+            <a:r>
+              <a:rPr lang="en-US" b="0" dirty="0">
+                <a:solidFill>
+                  <a:srgbClr val="6A9955"/>
+                </a:solidFill>
+                <a:effectLst/>
+                <a:latin typeface="Consolas" panose="020B0609020204030204" pitchFamily="49" charset="0"/>
+              </a:rPr>
+              <a:t> program that calculates if a given number is PRIME or not:</a:t>
+            </a:r>
+          </a:p>
+          <a:p>
+            <a:endParaRPr lang="en-US" b="0" dirty="0">
+              <a:solidFill>
+                <a:srgbClr val="6A9955"/>
+              </a:solidFill>
+              <a:effectLst/>
+              <a:latin typeface="Consolas" panose="020B0609020204030204" pitchFamily="49" charset="0"/>
+            </a:endParaRPr>
+          </a:p>
+          <a:p>
+            <a:r>
+              <a:rPr lang="en-US" dirty="0">
+                <a:solidFill>
+                  <a:srgbClr val="6A9955"/>
+                </a:solidFill>
+                <a:latin typeface="Consolas" panose="020B0609020204030204" pitchFamily="49" charset="0"/>
+              </a:rPr>
+              <a:t>//HINT: A Prime number is divisible by only one and itself. Ex: 3, 5, 7 </a:t>
+            </a:r>
+            <a:r>
+              <a:rPr lang="en-US" dirty="0" err="1">
+                <a:solidFill>
+                  <a:srgbClr val="6A9955"/>
+                </a:solidFill>
+                <a:latin typeface="Consolas" panose="020B0609020204030204" pitchFamily="49" charset="0"/>
+              </a:rPr>
+              <a:t>etc</a:t>
+            </a:r>
+            <a:r>
+              <a:rPr lang="en-US" dirty="0">
+                <a:solidFill>
+                  <a:srgbClr val="6A9955"/>
+                </a:solidFill>
+                <a:latin typeface="Consolas" panose="020B0609020204030204" pitchFamily="49" charset="0"/>
+              </a:rPr>
+              <a:t>…</a:t>
+            </a:r>
+          </a:p>
+          <a:p>
+            <a:r>
+              <a:rPr lang="en-US" b="0" dirty="0">
+                <a:solidFill>
+                  <a:srgbClr val="6A9955"/>
+                </a:solidFill>
+                <a:effectLst/>
+                <a:latin typeface="Consolas" panose="020B0609020204030204" pitchFamily="49" charset="0"/>
+              </a:rPr>
+              <a:t>//HINT: Use the modulo operator (%) to test if n % </a:t>
+            </a:r>
+            <a:r>
+              <a:rPr lang="en-US" b="0" dirty="0" err="1">
+                <a:solidFill>
+                  <a:srgbClr val="6A9955"/>
+                </a:solidFill>
+                <a:effectLst/>
+                <a:latin typeface="Consolas" panose="020B0609020204030204" pitchFamily="49" charset="0"/>
+              </a:rPr>
+              <a:t>i</a:t>
+            </a:r>
+            <a:r>
+              <a:rPr lang="en-US" b="0" dirty="0">
+                <a:solidFill>
+                  <a:srgbClr val="6A9955"/>
+                </a:solidFill>
+                <a:effectLst/>
+                <a:latin typeface="Consolas" panose="020B0609020204030204" pitchFamily="49" charset="0"/>
+              </a:rPr>
+              <a:t> == 0 (Where </a:t>
+            </a:r>
+            <a:r>
+              <a:rPr lang="en-US" b="0" dirty="0" err="1">
+                <a:solidFill>
+                  <a:srgbClr val="6A9955"/>
+                </a:solidFill>
+                <a:effectLst/>
+                <a:latin typeface="Consolas" panose="020B0609020204030204" pitchFamily="49" charset="0"/>
+              </a:rPr>
+              <a:t>i</a:t>
+            </a:r>
+            <a:r>
+              <a:rPr lang="en-US" b="0" dirty="0">
+                <a:solidFill>
+                  <a:srgbClr val="6A9955"/>
+                </a:solidFill>
+                <a:effectLst/>
+                <a:latin typeface="Consolas" panose="020B0609020204030204" pitchFamily="49" charset="0"/>
+              </a:rPr>
+              <a:t> is in the range</a:t>
+            </a:r>
+          </a:p>
+          <a:p>
+            <a:r>
+              <a:rPr lang="en-US" dirty="0">
+                <a:solidFill>
+                  <a:srgbClr val="6A9955"/>
+                </a:solidFill>
+                <a:latin typeface="Consolas" panose="020B0609020204030204" pitchFamily="49" charset="0"/>
+              </a:rPr>
+              <a:t>						1 to n)</a:t>
+            </a:r>
+          </a:p>
+          <a:p>
+            <a:r>
+              <a:rPr lang="en-US" b="0" dirty="0">
+                <a:solidFill>
+                  <a:srgbClr val="6A9955"/>
+                </a:solidFill>
+                <a:effectLst/>
+                <a:latin typeface="Consolas" panose="020B0609020204030204" pitchFamily="49" charset="0"/>
+              </a:rPr>
+              <a:t>//HINT</a:t>
+            </a:r>
+            <a:r>
+              <a:rPr lang="en-US" dirty="0">
+                <a:solidFill>
+                  <a:srgbClr val="6A9955"/>
+                </a:solidFill>
+                <a:latin typeface="Consolas" panose="020B0609020204030204" pitchFamily="49" charset="0"/>
+              </a:rPr>
+              <a:t>: Think ‘for loop’ and how to loop over a range of numbers, what would we //test on each loop cycle?</a:t>
+            </a:r>
+            <a:endParaRPr lang="en-US" b="0" dirty="0">
+              <a:solidFill>
+                <a:srgbClr val="CCCCCC"/>
+              </a:solidFill>
+              <a:effectLst/>
+              <a:latin typeface="Consolas" panose="020B0609020204030204" pitchFamily="49" charset="0"/>
+            </a:endParaRPr>
+          </a:p>
+          <a:p>
+            <a:br>
+              <a:rPr lang="en-US" b="0" dirty="0">
+                <a:solidFill>
+                  <a:srgbClr val="CCCCCC"/>
+                </a:solidFill>
+                <a:effectLst/>
+                <a:latin typeface="Consolas" panose="020B0609020204030204" pitchFamily="49" charset="0"/>
+              </a:rPr>
+            </a:br>
+            <a:endParaRPr lang="en-US" b="0" dirty="0">
+              <a:solidFill>
+                <a:srgbClr val="CCCCCC"/>
+              </a:solidFill>
+              <a:effectLst/>
+              <a:latin typeface="Consolas" panose="020B0609020204030204" pitchFamily="49" charset="0"/>
+            </a:endParaRPr>
+          </a:p>
+        </p:txBody>
+      </p:sp>
+    </p:spTree>
+    <p:extLst>
+      <p:ext uri="{BB962C8B-B14F-4D97-AF65-F5344CB8AC3E}">
+        <p14:creationId xmlns:p14="http://schemas.microsoft.com/office/powerpoint/2010/main" val="3849931513"/>
+      </p:ext>
+    </p:extLst>
+  </p:cSld>
+  <p:clrMapOvr>
+    <a:masterClrMapping/>
+  </p:clrMapOvr>
+</p:sld>
+</file>
+
+<file path=ppt/slides/slide2.xml><?xml version="1.0" encoding="utf-8"?>
+<p:sld xmlns:a="http://schemas.openxmlformats.org/drawingml/2006/main" xmlns:r="http://schemas.openxmlformats.org/officeDocument/2006/relationships" xmlns:p="http://schemas.openxmlformats.org/presentationml/2006/main">
+  <p:cSld>
+    <p:spTree>
+      <p:nvGrpSpPr>
+        <p:cNvPr id="1" name=""/>
+        <p:cNvGrpSpPr/>
+        <p:nvPr/>
+      </p:nvGrpSpPr>
+      <p:grpSpPr>
+        <a:xfrm>
+          <a:off x="0" y="0"/>
+          <a:ext cx="0" cy="0"/>
+          <a:chOff x="0" y="0"/>
+          <a:chExt cx="0" cy="0"/>
+        </a:xfrm>
+      </p:grpSpPr>
+      <p:sp>
+        <p:nvSpPr>
+          <p:cNvPr id="2" name="Google Shape;877;p41">
+            <a:extLst>
+              <a:ext uri="{FF2B5EF4-FFF2-40B4-BE49-F238E27FC236}">
+                <a16:creationId xmlns:a16="http://schemas.microsoft.com/office/drawing/2014/main" id="{5ADB7ACC-A2B7-1B53-17F4-9F2778AE1924}"/>
+              </a:ext>
+            </a:extLst>
+          </p:cNvPr>
+          <p:cNvSpPr txBox="1">
+            <a:spLocks noGrp="1"/>
+          </p:cNvSpPr>
+          <p:nvPr>
+            <p:ph type="title"/>
+          </p:nvPr>
+        </p:nvSpPr>
+        <p:spPr>
+          <a:xfrm>
+            <a:off x="2131541" y="166279"/>
+            <a:ext cx="4955059" cy="572700"/>
+          </a:xfrm>
+          <a:prstGeom prst="rect">
+            <a:avLst/>
+          </a:prstGeom>
+        </p:spPr>
+        <p:txBody>
+          <a:bodyPr spcFirstLastPara="1" wrap="square" lIns="91425" tIns="91425" rIns="91425" bIns="91425" anchor="t" anchorCtr="0">
+            <a:noAutofit/>
+          </a:bodyPr>
+          <a:lstStyle/>
+          <a:p>
+            <a:pPr marL="0" lvl="0" indent="0" rtl="0">
+              <a:spcBef>
+                <a:spcPts val="0"/>
+              </a:spcBef>
+              <a:spcAft>
+                <a:spcPts val="0"/>
+              </a:spcAft>
+              <a:buNone/>
+            </a:pPr>
+            <a:r>
+              <a:rPr lang="en-CA" sz="2400" dirty="0">
+                <a:solidFill>
+                  <a:schemeClr val="hlink"/>
+                </a:solidFill>
+                <a:uFill>
+                  <a:noFill/>
+                </a:uFill>
+              </a:rPr>
+              <a:t>Python</a:t>
+            </a:r>
+            <a:r>
+              <a:rPr lang="en-CA" sz="2400" dirty="0">
+                <a:solidFill>
+                  <a:schemeClr val="hlink"/>
+                </a:solidFill>
+                <a:uFill>
+                  <a:noFill/>
+                </a:uFill>
+                <a:latin typeface="Anton"/>
+                <a:ea typeface="Anton"/>
+                <a:cs typeface="Anton"/>
+                <a:sym typeface="Anton"/>
+              </a:rPr>
+              <a:t> Warm-Up Coding Exercises</a:t>
             </a:r>
             <a:endParaRPr lang="en-CA" sz="2400" dirty="0">
               <a:solidFill>
@@ -2995,311 +3310,7 @@
     </p:spTree>
     <p:extLst>
       <p:ext uri="{BB962C8B-B14F-4D97-AF65-F5344CB8AC3E}">
-        <p14:creationId xmlns:p14="http://schemas.microsoft.com/office/powerpoint/2010/main" val="3849931513"/>
-      </p:ext>
-    </p:extLst>
-  </p:cSld>
-  <p:clrMapOvr>
-    <a:masterClrMapping/>
-  </p:clrMapOvr>
-</p:sld>
-</file>
-
-<file path=ppt/slides/slide2.xml><?xml version="1.0" encoding="utf-8"?>
-<p:sld xmlns:a="http://schemas.openxmlformats.org/drawingml/2006/main" xmlns:r="http://schemas.openxmlformats.org/officeDocument/2006/relationships" xmlns:p="http://schemas.openxmlformats.org/presentationml/2006/main">
-  <p:cSld>
-    <p:spTree>
-      <p:nvGrpSpPr>
-        <p:cNvPr id="1" name=""/>
-        <p:cNvGrpSpPr/>
-        <p:nvPr/>
-      </p:nvGrpSpPr>
-      <p:grpSpPr>
-        <a:xfrm>
-          <a:off x="0" y="0"/>
-          <a:ext cx="0" cy="0"/>
-          <a:chOff x="0" y="0"/>
-          <a:chExt cx="0" cy="0"/>
-        </a:xfrm>
-      </p:grpSpPr>
-      <p:sp>
-        <p:nvSpPr>
-          <p:cNvPr id="2" name="Google Shape;877;p41">
-            <a:extLst>
-              <a:ext uri="{FF2B5EF4-FFF2-40B4-BE49-F238E27FC236}">
-                <a16:creationId xmlns:a16="http://schemas.microsoft.com/office/drawing/2014/main" id="{5ADB7ACC-A2B7-1B53-17F4-9F2778AE1924}"/>
-              </a:ext>
-            </a:extLst>
-          </p:cNvPr>
-          <p:cNvSpPr txBox="1">
-            <a:spLocks noGrp="1"/>
-          </p:cNvSpPr>
-          <p:nvPr>
-            <p:ph type="title"/>
-          </p:nvPr>
-        </p:nvSpPr>
-        <p:spPr>
-          <a:xfrm>
-            <a:off x="281335" y="383241"/>
-            <a:ext cx="7704000" cy="572700"/>
-          </a:xfrm>
-          <a:prstGeom prst="rect">
-            <a:avLst/>
-          </a:prstGeom>
-        </p:spPr>
-        <p:txBody>
-          <a:bodyPr spcFirstLastPara="1" wrap="square" lIns="91425" tIns="91425" rIns="91425" bIns="91425" anchor="t" anchorCtr="0">
-            <a:noAutofit/>
-          </a:bodyPr>
-          <a:lstStyle/>
-          <a:p>
-            <a:pPr marL="0" lvl="0" indent="0" rtl="0">
-              <a:spcBef>
-                <a:spcPts val="0"/>
-              </a:spcBef>
-              <a:spcAft>
-                <a:spcPts val="0"/>
-              </a:spcAft>
-              <a:buNone/>
-            </a:pPr>
-            <a:r>
-              <a:rPr lang="en-CA" sz="3200" dirty="0">
-                <a:solidFill>
-                  <a:schemeClr val="hlink"/>
-                </a:solidFill>
-                <a:uFill>
-                  <a:noFill/>
-                </a:uFill>
-                <a:latin typeface="Anton"/>
-                <a:ea typeface="Anton"/>
-                <a:cs typeface="Anton"/>
-                <a:sym typeface="Anton"/>
-              </a:rPr>
-              <a:t>#1 Coding Warm-Up: Loops &amp; Logic</a:t>
-            </a:r>
-            <a:endParaRPr lang="en-CA" sz="3200" dirty="0">
-              <a:solidFill>
-                <a:schemeClr val="dk1"/>
-              </a:solidFill>
-              <a:latin typeface="Anton"/>
-              <a:ea typeface="Anton"/>
-              <a:cs typeface="Anton"/>
-              <a:sym typeface="Anton"/>
-            </a:endParaRPr>
-          </a:p>
-        </p:txBody>
-      </p:sp>
-      <p:sp>
-        <p:nvSpPr>
-          <p:cNvPr id="3" name="TextBox 2">
-            <a:extLst>
-              <a:ext uri="{FF2B5EF4-FFF2-40B4-BE49-F238E27FC236}">
-                <a16:creationId xmlns:a16="http://schemas.microsoft.com/office/drawing/2014/main" id="{CE5790DA-742D-961A-C38F-E6DA2F4E3CD8}"/>
-              </a:ext>
-            </a:extLst>
-          </p:cNvPr>
-          <p:cNvSpPr txBox="1"/>
-          <p:nvPr/>
-        </p:nvSpPr>
-        <p:spPr>
-          <a:xfrm>
-            <a:off x="281335" y="1186755"/>
-            <a:ext cx="8297562" cy="2031325"/>
-          </a:xfrm>
-          <a:prstGeom prst="rect">
-            <a:avLst/>
-          </a:prstGeom>
-          <a:noFill/>
-        </p:spPr>
-        <p:txBody>
-          <a:bodyPr wrap="square">
-            <a:spAutoFit/>
-          </a:bodyPr>
-          <a:lstStyle/>
-          <a:p>
-            <a:r>
-              <a:rPr lang="en-US" b="0" dirty="0">
-                <a:solidFill>
-                  <a:srgbClr val="6A9955"/>
-                </a:solidFill>
-                <a:effectLst/>
-                <a:latin typeface="Consolas" panose="020B0609020204030204" pitchFamily="49" charset="0"/>
-              </a:rPr>
-              <a:t>//Write a </a:t>
-            </a:r>
-            <a:r>
-              <a:rPr lang="en-US" dirty="0">
-                <a:solidFill>
-                  <a:srgbClr val="6A9955"/>
-                </a:solidFill>
-                <a:latin typeface="Consolas" panose="020B0609020204030204" pitchFamily="49" charset="0"/>
-              </a:rPr>
-              <a:t>java</a:t>
-            </a:r>
-            <a:r>
-              <a:rPr lang="en-US" b="0" dirty="0">
-                <a:solidFill>
-                  <a:srgbClr val="6A9955"/>
-                </a:solidFill>
-                <a:effectLst/>
-                <a:latin typeface="Consolas" panose="020B0609020204030204" pitchFamily="49" charset="0"/>
-              </a:rPr>
-              <a:t> program that calculates if a given number is PRIME or not:</a:t>
-            </a:r>
-          </a:p>
-          <a:p>
-            <a:endParaRPr lang="en-US" b="0" dirty="0">
-              <a:solidFill>
-                <a:srgbClr val="6A9955"/>
-              </a:solidFill>
-              <a:effectLst/>
-              <a:latin typeface="Consolas" panose="020B0609020204030204" pitchFamily="49" charset="0"/>
-            </a:endParaRPr>
-          </a:p>
-          <a:p>
-            <a:r>
-              <a:rPr lang="en-US" dirty="0">
-                <a:solidFill>
-                  <a:srgbClr val="6A9955"/>
-                </a:solidFill>
-                <a:latin typeface="Consolas" panose="020B0609020204030204" pitchFamily="49" charset="0"/>
-              </a:rPr>
-              <a:t>//HINT: A Prime number is divisible by only one and itself. Ex: 3, 5, 7 </a:t>
-            </a:r>
-            <a:r>
-              <a:rPr lang="en-US" dirty="0" err="1">
-                <a:solidFill>
-                  <a:srgbClr val="6A9955"/>
-                </a:solidFill>
-                <a:latin typeface="Consolas" panose="020B0609020204030204" pitchFamily="49" charset="0"/>
-              </a:rPr>
-              <a:t>etc</a:t>
-            </a:r>
-            <a:r>
-              <a:rPr lang="en-US" dirty="0">
-                <a:solidFill>
-                  <a:srgbClr val="6A9955"/>
-                </a:solidFill>
-                <a:latin typeface="Consolas" panose="020B0609020204030204" pitchFamily="49" charset="0"/>
-              </a:rPr>
-              <a:t>…</a:t>
-            </a:r>
-          </a:p>
-          <a:p>
-            <a:r>
-              <a:rPr lang="en-US" b="0" dirty="0">
-                <a:solidFill>
-                  <a:srgbClr val="6A9955"/>
-                </a:solidFill>
-                <a:effectLst/>
-                <a:latin typeface="Consolas" panose="020B0609020204030204" pitchFamily="49" charset="0"/>
-              </a:rPr>
-              <a:t>//HINT: Use the modulo operator (%) to test if n % </a:t>
-            </a:r>
-            <a:r>
-              <a:rPr lang="en-US" b="0" dirty="0" err="1">
-                <a:solidFill>
-                  <a:srgbClr val="6A9955"/>
-                </a:solidFill>
-                <a:effectLst/>
-                <a:latin typeface="Consolas" panose="020B0609020204030204" pitchFamily="49" charset="0"/>
-              </a:rPr>
-              <a:t>i</a:t>
-            </a:r>
-            <a:r>
-              <a:rPr lang="en-US" b="0" dirty="0">
-                <a:solidFill>
-                  <a:srgbClr val="6A9955"/>
-                </a:solidFill>
-                <a:effectLst/>
-                <a:latin typeface="Consolas" panose="020B0609020204030204" pitchFamily="49" charset="0"/>
-              </a:rPr>
-              <a:t> == 0 (Where </a:t>
-            </a:r>
-            <a:r>
-              <a:rPr lang="en-US" b="0" dirty="0" err="1">
-                <a:solidFill>
-                  <a:srgbClr val="6A9955"/>
-                </a:solidFill>
-                <a:effectLst/>
-                <a:latin typeface="Consolas" panose="020B0609020204030204" pitchFamily="49" charset="0"/>
-              </a:rPr>
-              <a:t>i</a:t>
-            </a:r>
-            <a:r>
-              <a:rPr lang="en-US" b="0" dirty="0">
-                <a:solidFill>
-                  <a:srgbClr val="6A9955"/>
-                </a:solidFill>
-                <a:effectLst/>
-                <a:latin typeface="Consolas" panose="020B0609020204030204" pitchFamily="49" charset="0"/>
-              </a:rPr>
-              <a:t> is in the range</a:t>
-            </a:r>
-          </a:p>
-          <a:p>
-            <a:r>
-              <a:rPr lang="en-US" dirty="0">
-                <a:solidFill>
-                  <a:srgbClr val="6A9955"/>
-                </a:solidFill>
-                <a:latin typeface="Consolas" panose="020B0609020204030204" pitchFamily="49" charset="0"/>
-              </a:rPr>
-              <a:t>						1 to n)</a:t>
-            </a:r>
-          </a:p>
-          <a:p>
-            <a:r>
-              <a:rPr lang="en-US" b="0" dirty="0">
-                <a:solidFill>
-                  <a:srgbClr val="6A9955"/>
-                </a:solidFill>
-                <a:effectLst/>
-                <a:latin typeface="Consolas" panose="020B0609020204030204" pitchFamily="49" charset="0"/>
-              </a:rPr>
-              <a:t>//HINT</a:t>
-            </a:r>
-            <a:r>
-              <a:rPr lang="en-US" dirty="0">
-                <a:solidFill>
-                  <a:srgbClr val="6A9955"/>
-                </a:solidFill>
-                <a:latin typeface="Consolas" panose="020B0609020204030204" pitchFamily="49" charset="0"/>
-              </a:rPr>
-              <a:t>: Think ‘for loop’ and how to loop over a range of numbers, what would we //test on each loop cycle?</a:t>
-            </a:r>
-            <a:endParaRPr lang="en-US" b="0" dirty="0">
-              <a:solidFill>
-                <a:srgbClr val="CCCCCC"/>
-              </a:solidFill>
-              <a:effectLst/>
-              <a:latin typeface="Consolas" panose="020B0609020204030204" pitchFamily="49" charset="0"/>
-            </a:endParaRPr>
-          </a:p>
-          <a:p>
-            <a:br>
-              <a:rPr lang="en-US" b="0" dirty="0">
-                <a:solidFill>
-                  <a:srgbClr val="CCCCCC"/>
-                </a:solidFill>
-                <a:effectLst/>
-                <a:latin typeface="Consolas" panose="020B0609020204030204" pitchFamily="49" charset="0"/>
-              </a:rPr>
-            </a:br>
-            <a:endParaRPr lang="en-US" b="0" dirty="0">
-              <a:solidFill>
-                <a:srgbClr val="CCCCCC"/>
-              </a:solidFill>
-              <a:effectLst/>
-              <a:latin typeface="Consolas" panose="020B0609020204030204" pitchFamily="49" charset="0"/>
-            </a:endParaRPr>
-          </a:p>
-        </p:txBody>
-      </p:sp>
-    </p:spTree>
-    <p:extLst>
-      <p:ext uri="{BB962C8B-B14F-4D97-AF65-F5344CB8AC3E}">
-        <p14:creationId xmlns:p14="http://schemas.microsoft.com/office/powerpoint/2010/main" val="3367284672"/>
+        <p14:creationId xmlns:p14="http://schemas.microsoft.com/office/powerpoint/2010/main" val="3078484441"/>
       </p:ext>
     </p:extLst>
   </p:cSld>

</xml_diff>

<commit_message>
added notes on git cloning to your machine
</commit_message>
<xml_diff>
--- a/002_Course_Exercises/01_CS120_Warmup_Exercises.pptx
+++ b/002_Course_Exercises/01_CS120_Warmup_Exercises.pptx
@@ -5,41 +5,42 @@
     <p:sldMasterId id="2147483681" r:id="rId1"/>
   </p:sldMasterIdLst>
   <p:notesMasterIdLst>
-    <p:notesMasterId r:id="rId10"/>
+    <p:notesMasterId r:id="rId11"/>
   </p:notesMasterIdLst>
   <p:sldIdLst>
     <p:sldId id="343" r:id="rId2"/>
-    <p:sldId id="336" r:id="rId3"/>
-    <p:sldId id="338" r:id="rId4"/>
-    <p:sldId id="337" r:id="rId5"/>
-    <p:sldId id="339" r:id="rId6"/>
-    <p:sldId id="341" r:id="rId7"/>
-    <p:sldId id="340" r:id="rId8"/>
-    <p:sldId id="342" r:id="rId9"/>
+    <p:sldId id="344" r:id="rId3"/>
+    <p:sldId id="336" r:id="rId4"/>
+    <p:sldId id="338" r:id="rId5"/>
+    <p:sldId id="337" r:id="rId6"/>
+    <p:sldId id="339" r:id="rId7"/>
+    <p:sldId id="341" r:id="rId8"/>
+    <p:sldId id="340" r:id="rId9"/>
+    <p:sldId id="342" r:id="rId10"/>
   </p:sldIdLst>
   <p:sldSz cx="9144000" cy="5143500" type="screen16x9"/>
   <p:notesSz cx="6858000" cy="9144000"/>
   <p:embeddedFontLst>
     <p:embeddedFont>
       <p:font typeface="Anton" pitchFamily="2" charset="0"/>
-      <p:regular r:id="rId11"/>
+      <p:regular r:id="rId12"/>
     </p:embeddedFont>
     <p:embeddedFont>
       <p:font typeface="Catamaran" panose="020B0604020202020204" charset="0"/>
-      <p:regular r:id="rId12"/>
-      <p:bold r:id="rId13"/>
+      <p:regular r:id="rId13"/>
+      <p:bold r:id="rId14"/>
     </p:embeddedFont>
     <p:embeddedFont>
       <p:font typeface="Consolas" panose="020B0609020204030204" pitchFamily="49" charset="0"/>
-      <p:regular r:id="rId14"/>
-      <p:bold r:id="rId15"/>
-      <p:italic r:id="rId16"/>
-      <p:boldItalic r:id="rId17"/>
+      <p:regular r:id="rId15"/>
+      <p:bold r:id="rId16"/>
+      <p:italic r:id="rId17"/>
+      <p:boldItalic r:id="rId18"/>
     </p:embeddedFont>
     <p:embeddedFont>
       <p:font typeface="Nunito Light" pitchFamily="2" charset="0"/>
-      <p:regular r:id="rId18"/>
-      <p:italic r:id="rId19"/>
+      <p:regular r:id="rId19"/>
+      <p:italic r:id="rId20"/>
     </p:embeddedFont>
   </p:embeddedFontLst>
   <p:defaultTextStyle>
@@ -3010,6 +3011,406 @@
   <p:cSld>
     <p:spTree>
       <p:nvGrpSpPr>
+        <p:cNvPr id="1" name="">
+          <a:extLst>
+            <a:ext uri="{FF2B5EF4-FFF2-40B4-BE49-F238E27FC236}">
+              <a16:creationId xmlns:a16="http://schemas.microsoft.com/office/drawing/2014/main" id="{20C4F288-83AD-0D31-A821-90A8774C717C}"/>
+            </a:ext>
+          </a:extLst>
+        </p:cNvPr>
+        <p:cNvGrpSpPr/>
+        <p:nvPr/>
+      </p:nvGrpSpPr>
+      <p:grpSpPr>
+        <a:xfrm>
+          <a:off x="0" y="0"/>
+          <a:ext cx="0" cy="0"/>
+          <a:chOff x="0" y="0"/>
+          <a:chExt cx="0" cy="0"/>
+        </a:xfrm>
+      </p:grpSpPr>
+      <p:sp>
+        <p:nvSpPr>
+          <p:cNvPr id="2" name="Google Shape;877;p41">
+            <a:extLst>
+              <a:ext uri="{FF2B5EF4-FFF2-40B4-BE49-F238E27FC236}">
+                <a16:creationId xmlns:a16="http://schemas.microsoft.com/office/drawing/2014/main" id="{A5EAC2C4-B54C-99F1-0D3A-896E01EADD6F}"/>
+              </a:ext>
+            </a:extLst>
+          </p:cNvPr>
+          <p:cNvSpPr txBox="1">
+            <a:spLocks noGrp="1"/>
+          </p:cNvSpPr>
+          <p:nvPr>
+            <p:ph type="title"/>
+          </p:nvPr>
+        </p:nvSpPr>
+        <p:spPr>
+          <a:xfrm>
+            <a:off x="930064" y="352349"/>
+            <a:ext cx="7704000" cy="572700"/>
+          </a:xfrm>
+          <a:prstGeom prst="rect">
+            <a:avLst/>
+          </a:prstGeom>
+        </p:spPr>
+        <p:txBody>
+          <a:bodyPr spcFirstLastPara="1" wrap="square" lIns="91425" tIns="91425" rIns="91425" bIns="91425" anchor="t" anchorCtr="0">
+            <a:noAutofit/>
+          </a:bodyPr>
+          <a:lstStyle/>
+          <a:p>
+            <a:pPr marL="0" lvl="0" indent="0" rtl="0">
+              <a:spcBef>
+                <a:spcPts val="0"/>
+              </a:spcBef>
+              <a:spcAft>
+                <a:spcPts val="0"/>
+              </a:spcAft>
+              <a:buNone/>
+            </a:pPr>
+            <a:r>
+              <a:rPr lang="en-CA" sz="3200" dirty="0">
+                <a:solidFill>
+                  <a:schemeClr val="hlink"/>
+                </a:solidFill>
+                <a:uFill>
+                  <a:noFill/>
+                </a:uFill>
+                <a:latin typeface="Anton"/>
+                <a:ea typeface="Anton"/>
+                <a:cs typeface="Anton"/>
+                <a:sym typeface="Anton"/>
+              </a:rPr>
+              <a:t>CONFIGURING GIT and GIT BASH TO CLONE REPO</a:t>
+            </a:r>
+            <a:endParaRPr lang="en-CA" sz="3200" dirty="0">
+              <a:solidFill>
+                <a:schemeClr val="dk1"/>
+              </a:solidFill>
+              <a:latin typeface="Anton"/>
+              <a:ea typeface="Anton"/>
+              <a:cs typeface="Anton"/>
+              <a:sym typeface="Anton"/>
+            </a:endParaRPr>
+          </a:p>
+        </p:txBody>
+      </p:sp>
+      <p:sp>
+        <p:nvSpPr>
+          <p:cNvPr id="11" name="TextBox 10">
+            <a:extLst>
+              <a:ext uri="{FF2B5EF4-FFF2-40B4-BE49-F238E27FC236}">
+                <a16:creationId xmlns:a16="http://schemas.microsoft.com/office/drawing/2014/main" id="{56225C7E-50FA-43FB-EFB7-07A92BE87F78}"/>
+              </a:ext>
+            </a:extLst>
+          </p:cNvPr>
+          <p:cNvSpPr txBox="1"/>
+          <p:nvPr/>
+        </p:nvSpPr>
+        <p:spPr>
+          <a:xfrm>
+            <a:off x="1464276" y="1143000"/>
+            <a:ext cx="6091881" cy="3108543"/>
+          </a:xfrm>
+          <a:prstGeom prst="rect">
+            <a:avLst/>
+          </a:prstGeom>
+          <a:noFill/>
+        </p:spPr>
+        <p:txBody>
+          <a:bodyPr wrap="square" rtlCol="0">
+            <a:spAutoFit/>
+          </a:bodyPr>
+          <a:lstStyle/>
+          <a:p>
+            <a:r>
+              <a:rPr lang="en-US" dirty="0">
+                <a:solidFill>
+                  <a:schemeClr val="tx1"/>
+                </a:solidFill>
+              </a:rPr>
+              <a:t>Our secured network relies on Trust Certificates Signed By NBED to allow traffic via https. Git requires steps to use certificates on your computers:</a:t>
+            </a:r>
+          </a:p>
+          <a:p>
+            <a:endParaRPr lang="en-US" dirty="0">
+              <a:solidFill>
+                <a:schemeClr val="tx1"/>
+              </a:solidFill>
+            </a:endParaRPr>
+          </a:p>
+          <a:p>
+            <a:endParaRPr lang="en-US" dirty="0">
+              <a:solidFill>
+                <a:schemeClr val="tx1"/>
+              </a:solidFill>
+            </a:endParaRPr>
+          </a:p>
+          <a:p>
+            <a:r>
+              <a:rPr lang="en-US" dirty="0">
+                <a:solidFill>
+                  <a:schemeClr val="tx1"/>
+                </a:solidFill>
+              </a:rPr>
+              <a:t>OPEN GIT BASH -&gt; Right Click Anywhere on your desktop</a:t>
+            </a:r>
+          </a:p>
+          <a:p>
+            <a:endParaRPr lang="en-US" dirty="0">
+              <a:solidFill>
+                <a:schemeClr val="tx1"/>
+              </a:solidFill>
+            </a:endParaRPr>
+          </a:p>
+          <a:p>
+            <a:endParaRPr lang="en-US" dirty="0">
+              <a:solidFill>
+                <a:schemeClr val="tx1"/>
+              </a:solidFill>
+            </a:endParaRPr>
+          </a:p>
+          <a:p>
+            <a:r>
+              <a:rPr lang="en-US" dirty="0">
+                <a:solidFill>
+                  <a:schemeClr val="tx1"/>
+                </a:solidFill>
+              </a:rPr>
+              <a:t>TYPE:   </a:t>
+            </a:r>
+            <a:r>
+              <a:rPr lang="en-US" dirty="0">
+                <a:solidFill>
+                  <a:srgbClr val="00B050"/>
+                </a:solidFill>
+              </a:rPr>
+              <a:t>git config --global </a:t>
+            </a:r>
+            <a:r>
+              <a:rPr lang="en-US" dirty="0" err="1">
+                <a:solidFill>
+                  <a:srgbClr val="00B050"/>
+                </a:solidFill>
+              </a:rPr>
+              <a:t>http.sslbackend</a:t>
+            </a:r>
+            <a:r>
+              <a:rPr lang="en-US" dirty="0">
+                <a:solidFill>
+                  <a:srgbClr val="00B050"/>
+                </a:solidFill>
+              </a:rPr>
+              <a:t> </a:t>
+            </a:r>
+            <a:r>
+              <a:rPr lang="en-US" dirty="0" err="1">
+                <a:solidFill>
+                  <a:srgbClr val="00B050"/>
+                </a:solidFill>
+              </a:rPr>
+              <a:t>schannel</a:t>
+            </a:r>
+            <a:r>
+              <a:rPr lang="en-US" dirty="0">
+                <a:solidFill>
+                  <a:srgbClr val="00B050"/>
+                </a:solidFill>
+              </a:rPr>
+              <a:t> </a:t>
+            </a:r>
+          </a:p>
+          <a:p>
+            <a:endParaRPr lang="en-US" dirty="0">
+              <a:solidFill>
+                <a:schemeClr val="tx1"/>
+              </a:solidFill>
+            </a:endParaRPr>
+          </a:p>
+          <a:p>
+            <a:r>
+              <a:rPr lang="en-US" dirty="0">
+                <a:solidFill>
+                  <a:schemeClr val="tx1"/>
+                </a:solidFill>
+              </a:rPr>
+              <a:t>HIT ENTER</a:t>
+            </a:r>
+          </a:p>
+          <a:p>
+            <a:endParaRPr lang="en-US" dirty="0">
+              <a:solidFill>
+                <a:schemeClr val="tx1"/>
+              </a:solidFill>
+            </a:endParaRPr>
+          </a:p>
+          <a:p>
+            <a:r>
+              <a:rPr lang="en-US" dirty="0">
+                <a:solidFill>
+                  <a:schemeClr val="tx1"/>
+                </a:solidFill>
+              </a:rPr>
+              <a:t>TO CLONE THE CLASS GIT REPO, TYPE:</a:t>
+            </a:r>
+          </a:p>
+          <a:p>
+            <a:endParaRPr lang="en-US" dirty="0">
+              <a:solidFill>
+                <a:schemeClr val="tx1"/>
+              </a:solidFill>
+            </a:endParaRPr>
+          </a:p>
+          <a:p>
+            <a:r>
+              <a:rPr lang="en-US" dirty="0">
+                <a:solidFill>
+                  <a:srgbClr val="00B050"/>
+                </a:solidFill>
+              </a:rPr>
+              <a:t>git clone https://github.com/CompSci-120-LHHS/cs120mainclass.git</a:t>
+            </a:r>
+          </a:p>
+        </p:txBody>
+      </p:sp>
+      <p:sp>
+        <p:nvSpPr>
+          <p:cNvPr id="12" name="Rectangle 1">
+            <a:extLst>
+              <a:ext uri="{FF2B5EF4-FFF2-40B4-BE49-F238E27FC236}">
+                <a16:creationId xmlns:a16="http://schemas.microsoft.com/office/drawing/2014/main" id="{EB7330E4-DB5C-7EDB-0F3D-6D9FCAFC6EC6}"/>
+              </a:ext>
+            </a:extLst>
+          </p:cNvPr>
+          <p:cNvSpPr>
+            <a:spLocks noChangeArrowheads="1"/>
+          </p:cNvSpPr>
+          <p:nvPr/>
+        </p:nvSpPr>
+        <p:spPr bwMode="auto">
+          <a:xfrm>
+            <a:off x="0" y="0"/>
+            <a:ext cx="9144000" cy="457200"/>
+          </a:xfrm>
+          <a:prstGeom prst="rect">
+            <a:avLst/>
+          </a:prstGeom>
+          <a:noFill/>
+          <a:ln>
+            <a:noFill/>
+          </a:ln>
+          <a:effectLst/>
+          <a:extLst>
+            <a:ext uri="{909E8E84-426E-40DD-AFC4-6F175D3DCCD1}">
+              <a14:hiddenFill xmlns:a14="http://schemas.microsoft.com/office/drawing/2010/main">
+                <a:solidFill>
+                  <a:schemeClr val="accent1"/>
+                </a:solidFill>
+              </a14:hiddenFill>
+            </a:ext>
+            <a:ext uri="{91240B29-F687-4F45-9708-019B960494DF}">
+              <a14:hiddenLine xmlns:a14="http://schemas.microsoft.com/office/drawing/2010/main" w="9525">
+                <a:solidFill>
+                  <a:schemeClr val="tx1"/>
+                </a:solidFill>
+                <a:miter lim="800000"/>
+                <a:headEnd/>
+                <a:tailEnd/>
+              </a14:hiddenLine>
+            </a:ext>
+            <a:ext uri="{AF507438-7753-43E0-B8FC-AC1667EBCBE1}">
+              <a14:hiddenEffects xmlns:a14="http://schemas.microsoft.com/office/drawing/2010/main">
+                <a:effectLst>
+                  <a:outerShdw dist="35921" dir="2700000" algn="ctr" rotWithShape="0">
+                    <a:schemeClr val="bg2"/>
+                  </a:outerShdw>
+                </a:effectLst>
+              </a14:hiddenEffects>
+            </a:ext>
+          </a:extLst>
+        </p:spPr>
+        <p:txBody>
+          <a:bodyPr vert="horz" wrap="none" lIns="0" tIns="0" rIns="0" bIns="0" numCol="1" anchor="ctr" anchorCtr="0" compatLnSpc="1">
+            <a:prstTxWarp prst="textNoShape">
+              <a:avLst/>
+            </a:prstTxWarp>
+            <a:spAutoFit/>
+          </a:bodyPr>
+          <a:lstStyle/>
+          <a:p>
+            <a:pPr marL="0" marR="0" lvl="0" indent="0" algn="l" defTabSz="914400" rtl="0" eaLnBrk="0" fontAlgn="base" latinLnBrk="0" hangingPunct="0">
+              <a:lnSpc>
+                <a:spcPct val="100000"/>
+              </a:lnSpc>
+              <a:spcBef>
+                <a:spcPct val="0"/>
+              </a:spcBef>
+              <a:spcAft>
+                <a:spcPct val="0"/>
+              </a:spcAft>
+              <a:buClrTx/>
+              <a:buSzTx/>
+              <a:buFontTx/>
+              <a:buNone/>
+              <a:tabLst/>
+            </a:pPr>
+            <a:r>
+              <a:rPr kumimoji="0" lang="en-US" altLang="en-US" sz="1000" b="0" i="0" u="none" strike="noStrike" cap="none" normalizeH="0" baseline="0">
+                <a:ln>
+                  <a:noFill/>
+                </a:ln>
+                <a:solidFill>
+                  <a:srgbClr val="0C0D0E"/>
+                </a:solidFill>
+                <a:effectLst/>
+                <a:latin typeface="var(--ff-mono)"/>
+              </a:rPr>
+              <a:t>git config --global http.sslbackend schannel</a:t>
+            </a:r>
+            <a:r>
+              <a:rPr kumimoji="0" lang="en-US" altLang="en-US" sz="600" b="0" i="0" u="none" strike="noStrike" cap="none" normalizeH="0" baseline="0">
+                <a:ln>
+                  <a:noFill/>
+                </a:ln>
+                <a:solidFill>
+                  <a:schemeClr val="tx1"/>
+                </a:solidFill>
+                <a:effectLst/>
+              </a:rPr>
+              <a:t> </a:t>
+            </a:r>
+            <a:endParaRPr kumimoji="0" lang="en-US" altLang="en-US" sz="1800" b="0" i="0" u="none" strike="noStrike" cap="none" normalizeH="0" baseline="0">
+              <a:ln>
+                <a:noFill/>
+              </a:ln>
+              <a:solidFill>
+                <a:schemeClr val="tx1"/>
+              </a:solidFill>
+              <a:effectLst/>
+              <a:latin typeface="Arial" panose="020B0604020202020204" pitchFamily="34" charset="0"/>
+            </a:endParaRPr>
+          </a:p>
+        </p:txBody>
+      </p:sp>
+    </p:spTree>
+    <p:extLst>
+      <p:ext uri="{BB962C8B-B14F-4D97-AF65-F5344CB8AC3E}">
+        <p14:creationId xmlns:p14="http://schemas.microsoft.com/office/powerpoint/2010/main" val="2555175708"/>
+      </p:ext>
+    </p:extLst>
+  </p:cSld>
+  <p:clrMapOvr>
+    <a:masterClrMapping/>
+  </p:clrMapOvr>
+</p:sld>
+</file>
+
+<file path=ppt/slides/slide3.xml><?xml version="1.0" encoding="utf-8"?>
+<p:sld xmlns:a="http://schemas.openxmlformats.org/drawingml/2006/main" xmlns:r="http://schemas.openxmlformats.org/officeDocument/2006/relationships" xmlns:p="http://schemas.openxmlformats.org/presentationml/2006/main">
+  <p:cSld>
+    <p:spTree>
+      <p:nvGrpSpPr>
         <p:cNvPr id="1" name=""/>
         <p:cNvGrpSpPr/>
         <p:nvPr/>
@@ -3309,7 +3710,7 @@
 </p:sld>
 </file>
 
-<file path=ppt/slides/slide3.xml><?xml version="1.0" encoding="utf-8"?>
+<file path=ppt/slides/slide4.xml><?xml version="1.0" encoding="utf-8"?>
 <p:sld xmlns:a="http://schemas.openxmlformats.org/drawingml/2006/main" xmlns:r="http://schemas.openxmlformats.org/officeDocument/2006/relationships" xmlns:p="http://schemas.openxmlformats.org/presentationml/2006/main">
   <p:cSld>
     <p:spTree>
@@ -3756,7 +4157,7 @@
 </p:sld>
 </file>
 
-<file path=ppt/slides/slide4.xml><?xml version="1.0" encoding="utf-8"?>
+<file path=ppt/slides/slide5.xml><?xml version="1.0" encoding="utf-8"?>
 <p:sld xmlns:a="http://schemas.openxmlformats.org/drawingml/2006/main" xmlns:r="http://schemas.openxmlformats.org/officeDocument/2006/relationships" xmlns:p="http://schemas.openxmlformats.org/presentationml/2006/main">
   <p:cSld>
     <p:spTree>
@@ -4013,196 +4414,6 @@
     <p:extLst>
       <p:ext uri="{BB962C8B-B14F-4D97-AF65-F5344CB8AC3E}">
         <p14:creationId xmlns:p14="http://schemas.microsoft.com/office/powerpoint/2010/main" val="1948646992"/>
-      </p:ext>
-    </p:extLst>
-  </p:cSld>
-  <p:clrMapOvr>
-    <a:masterClrMapping/>
-  </p:clrMapOvr>
-</p:sld>
-</file>
-
-<file path=ppt/slides/slide5.xml><?xml version="1.0" encoding="utf-8"?>
-<p:sld xmlns:a="http://schemas.openxmlformats.org/drawingml/2006/main" xmlns:r="http://schemas.openxmlformats.org/officeDocument/2006/relationships" xmlns:p="http://schemas.openxmlformats.org/presentationml/2006/main">
-  <p:cSld>
-    <p:spTree>
-      <p:nvGrpSpPr>
-        <p:cNvPr id="1" name="">
-          <a:extLst>
-            <a:ext uri="{FF2B5EF4-FFF2-40B4-BE49-F238E27FC236}">
-              <a16:creationId xmlns:a16="http://schemas.microsoft.com/office/drawing/2014/main" id="{20C4F288-83AD-0D31-A821-90A8774C717C}"/>
-            </a:ext>
-          </a:extLst>
-        </p:cNvPr>
-        <p:cNvGrpSpPr/>
-        <p:nvPr/>
-      </p:nvGrpSpPr>
-      <p:grpSpPr>
-        <a:xfrm>
-          <a:off x="0" y="0"/>
-          <a:ext cx="0" cy="0"/>
-          <a:chOff x="0" y="0"/>
-          <a:chExt cx="0" cy="0"/>
-        </a:xfrm>
-      </p:grpSpPr>
-      <p:sp>
-        <p:nvSpPr>
-          <p:cNvPr id="2" name="Google Shape;877;p41">
-            <a:extLst>
-              <a:ext uri="{FF2B5EF4-FFF2-40B4-BE49-F238E27FC236}">
-                <a16:creationId xmlns:a16="http://schemas.microsoft.com/office/drawing/2014/main" id="{A5EAC2C4-B54C-99F1-0D3A-896E01EADD6F}"/>
-              </a:ext>
-            </a:extLst>
-          </p:cNvPr>
-          <p:cNvSpPr txBox="1">
-            <a:spLocks noGrp="1"/>
-          </p:cNvSpPr>
-          <p:nvPr>
-            <p:ph type="title"/>
-          </p:nvPr>
-        </p:nvSpPr>
-        <p:spPr>
-          <a:xfrm>
-            <a:off x="281335" y="383241"/>
-            <a:ext cx="7704000" cy="572700"/>
-          </a:xfrm>
-          <a:prstGeom prst="rect">
-            <a:avLst/>
-          </a:prstGeom>
-        </p:spPr>
-        <p:txBody>
-          <a:bodyPr spcFirstLastPara="1" wrap="square" lIns="91425" tIns="91425" rIns="91425" bIns="91425" anchor="t" anchorCtr="0">
-            <a:noAutofit/>
-          </a:bodyPr>
-          <a:lstStyle/>
-          <a:p>
-            <a:pPr marL="0" lvl="0" indent="0" rtl="0">
-              <a:spcBef>
-                <a:spcPts val="0"/>
-              </a:spcBef>
-              <a:spcAft>
-                <a:spcPts val="0"/>
-              </a:spcAft>
-              <a:buNone/>
-            </a:pPr>
-            <a:r>
-              <a:rPr lang="en-CA" sz="3200" dirty="0">
-                <a:solidFill>
-                  <a:schemeClr val="hlink"/>
-                </a:solidFill>
-                <a:uFill>
-                  <a:noFill/>
-                </a:uFill>
-                <a:latin typeface="Anton"/>
-                <a:ea typeface="Anton"/>
-                <a:cs typeface="Anton"/>
-                <a:sym typeface="Anton"/>
-              </a:rPr>
-              <a:t>#4 Coding Warm-Up: </a:t>
-            </a:r>
-            <a:r>
-              <a:rPr lang="en-CA" sz="3200" dirty="0">
-                <a:solidFill>
-                  <a:schemeClr val="hlink"/>
-                </a:solidFill>
-                <a:uFill>
-                  <a:noFill/>
-                </a:uFill>
-              </a:rPr>
-              <a:t>Methods</a:t>
-            </a:r>
-            <a:endParaRPr lang="en-CA" sz="3200" dirty="0">
-              <a:solidFill>
-                <a:schemeClr val="dk1"/>
-              </a:solidFill>
-              <a:latin typeface="Anton"/>
-              <a:ea typeface="Anton"/>
-              <a:cs typeface="Anton"/>
-              <a:sym typeface="Anton"/>
-            </a:endParaRPr>
-          </a:p>
-        </p:txBody>
-      </p:sp>
-      <p:sp>
-        <p:nvSpPr>
-          <p:cNvPr id="3" name="TextBox 2">
-            <a:extLst>
-              <a:ext uri="{FF2B5EF4-FFF2-40B4-BE49-F238E27FC236}">
-                <a16:creationId xmlns:a16="http://schemas.microsoft.com/office/drawing/2014/main" id="{5B10B59A-12F2-A80B-6F60-01FDCAEAAEF7}"/>
-              </a:ext>
-            </a:extLst>
-          </p:cNvPr>
-          <p:cNvSpPr txBox="1"/>
-          <p:nvPr/>
-        </p:nvSpPr>
-        <p:spPr>
-          <a:xfrm>
-            <a:off x="281335" y="1186755"/>
-            <a:ext cx="8297562" cy="738664"/>
-          </a:xfrm>
-          <a:prstGeom prst="rect">
-            <a:avLst/>
-          </a:prstGeom>
-          <a:noFill/>
-        </p:spPr>
-        <p:txBody>
-          <a:bodyPr wrap="square">
-            <a:spAutoFit/>
-          </a:bodyPr>
-          <a:lstStyle/>
-          <a:p>
-            <a:r>
-              <a:rPr lang="en-US" b="0" dirty="0">
-                <a:solidFill>
-                  <a:srgbClr val="6A9955"/>
-                </a:solidFill>
-                <a:effectLst/>
-                <a:latin typeface="Consolas" panose="020B0609020204030204" pitchFamily="49" charset="0"/>
-              </a:rPr>
-              <a:t>#Write a </a:t>
-            </a:r>
-            <a:r>
-              <a:rPr lang="en-US" dirty="0">
-                <a:solidFill>
-                  <a:srgbClr val="6A9955"/>
-                </a:solidFill>
-                <a:latin typeface="Consolas" panose="020B0609020204030204" pitchFamily="49" charset="0"/>
-              </a:rPr>
-              <a:t>java</a:t>
-            </a:r>
-            <a:r>
-              <a:rPr lang="en-US" b="0" dirty="0">
-                <a:solidFill>
-                  <a:srgbClr val="6A9955"/>
-                </a:solidFill>
-                <a:effectLst/>
-                <a:latin typeface="Consolas" panose="020B0609020204030204" pitchFamily="49" charset="0"/>
-              </a:rPr>
-              <a:t> program that includes a method that applies a raise amount of 5% to an employee’s salary when ever it is called: </a:t>
-            </a:r>
-            <a:br>
-              <a:rPr lang="en-US" b="0" dirty="0">
-                <a:solidFill>
-                  <a:srgbClr val="CCCCCC"/>
-                </a:solidFill>
-                <a:effectLst/>
-                <a:latin typeface="Consolas" panose="020B0609020204030204" pitchFamily="49" charset="0"/>
-              </a:rPr>
-            </a:br>
-            <a:endParaRPr lang="en-US" b="0" dirty="0">
-              <a:solidFill>
-                <a:srgbClr val="CCCCCC"/>
-              </a:solidFill>
-              <a:effectLst/>
-              <a:latin typeface="Consolas" panose="020B0609020204030204" pitchFamily="49" charset="0"/>
-            </a:endParaRPr>
-          </a:p>
-        </p:txBody>
-      </p:sp>
-    </p:spTree>
-    <p:extLst>
-      <p:ext uri="{BB962C8B-B14F-4D97-AF65-F5344CB8AC3E}">
-        <p14:creationId xmlns:p14="http://schemas.microsoft.com/office/powerpoint/2010/main" val="3439433472"/>
       </p:ext>
     </p:extLst>
   </p:cSld>
@@ -4288,7 +4499,7 @@
                 <a:cs typeface="Anton"/>
                 <a:sym typeface="Anton"/>
               </a:rPr>
-              <a:t>#5 Coding Warm-Up: </a:t>
+              <a:t>#4 Coding Warm-Up: </a:t>
             </a:r>
             <a:r>
               <a:rPr lang="en-CA" sz="3200" dirty="0">
@@ -4299,7 +4510,7 @@
                   <a:noFill/>
                 </a:uFill>
               </a:rPr>
-              <a:t>Defining a Class</a:t>
+              <a:t>Methods</a:t>
             </a:r>
             <a:endParaRPr lang="en-CA" sz="3200" dirty="0">
               <a:solidFill>
@@ -4328,7 +4539,7 @@
         <p:spPr>
           <a:xfrm>
             <a:off x="281335" y="1186755"/>
-            <a:ext cx="8297562" cy="2893100"/>
+            <a:ext cx="8297562" cy="738664"/>
           </a:xfrm>
           <a:prstGeom prst="rect">
             <a:avLst/>
@@ -4342,207 +4553,33 @@
           <a:lstStyle/>
           <a:p>
             <a:r>
+              <a:rPr lang="en-US" b="0" dirty="0">
+                <a:solidFill>
+                  <a:srgbClr val="6A9955"/>
+                </a:solidFill>
+                <a:effectLst/>
+                <a:latin typeface="Consolas" panose="020B0609020204030204" pitchFamily="49" charset="0"/>
+              </a:rPr>
+              <a:t>#Write a </a:t>
+            </a:r>
+            <a:r>
               <a:rPr lang="en-US" dirty="0">
                 <a:solidFill>
                   <a:srgbClr val="6A9955"/>
                 </a:solidFill>
                 <a:latin typeface="Consolas" panose="020B0609020204030204" pitchFamily="49" charset="0"/>
               </a:rPr>
-              <a:t>//Create a Rectangle class, with attributes height, width, and color.</a:t>
-            </a:r>
-          </a:p>
-          <a:p>
-            <a:endParaRPr lang="en-US" dirty="0">
-              <a:solidFill>
-                <a:srgbClr val="6A9955"/>
-              </a:solidFill>
-              <a:latin typeface="Consolas" panose="020B0609020204030204" pitchFamily="49" charset="0"/>
-            </a:endParaRPr>
-          </a:p>
-          <a:p>
-            <a:r>
-              <a:rPr lang="en-US" dirty="0">
+              <a:t>java</a:t>
+            </a:r>
+            <a:r>
+              <a:rPr lang="en-US" b="0" dirty="0">
                 <a:solidFill>
                   <a:srgbClr val="6A9955"/>
                 </a:solidFill>
-                <a:latin typeface="Consolas" panose="020B0609020204030204" pitchFamily="49" charset="0"/>
-              </a:rPr>
-              <a:t>/* It has 3 constructors: </a:t>
-            </a:r>
-          </a:p>
-          <a:p>
-            <a:r>
-              <a:rPr lang="en-US" dirty="0">
-                <a:solidFill>
-                  <a:srgbClr val="6A9955"/>
-                </a:solidFill>
-                <a:latin typeface="Consolas" panose="020B0609020204030204" pitchFamily="49" charset="0"/>
-              </a:rPr>
-              <a:t>1) one that takes in no information and sets the height, width, and color to 1.0,         </a:t>
-            </a:r>
-          </a:p>
-          <a:p>
-            <a:r>
-              <a:rPr lang="en-US" dirty="0">
-                <a:solidFill>
-                  <a:srgbClr val="6A9955"/>
-                </a:solidFill>
-                <a:latin typeface="Consolas" panose="020B0609020204030204" pitchFamily="49" charset="0"/>
-              </a:rPr>
-              <a:t>   2.0, and “red”</a:t>
-            </a:r>
-          </a:p>
-          <a:p>
-            <a:r>
-              <a:rPr lang="en-US" dirty="0">
-                <a:solidFill>
-                  <a:srgbClr val="6A9955"/>
-                </a:solidFill>
-                <a:latin typeface="Consolas" panose="020B0609020204030204" pitchFamily="49" charset="0"/>
-              </a:rPr>
-              <a:t>2) a second that takes in two doubles, and sets the height equal to the first  </a:t>
-            </a:r>
-          </a:p>
-          <a:p>
-            <a:r>
-              <a:rPr lang="en-US" dirty="0">
-                <a:solidFill>
-                  <a:srgbClr val="6A9955"/>
-                </a:solidFill>
-                <a:latin typeface="Consolas" panose="020B0609020204030204" pitchFamily="49" charset="0"/>
-              </a:rPr>
-              <a:t>   double, the width equal to the second double, and the color equal to “none”</a:t>
-            </a:r>
-          </a:p>
-          <a:p>
-            <a:endParaRPr lang="en-US" dirty="0">
-              <a:solidFill>
-                <a:srgbClr val="6A9955"/>
-              </a:solidFill>
-              <a:latin typeface="Consolas" panose="020B0609020204030204" pitchFamily="49" charset="0"/>
-            </a:endParaRPr>
-          </a:p>
-          <a:p>
-            <a:r>
-              <a:rPr lang="en-US" dirty="0">
-                <a:solidFill>
-                  <a:srgbClr val="6A9955"/>
-                </a:solidFill>
-                <a:latin typeface="Consolas" panose="020B0609020204030204" pitchFamily="49" charset="0"/>
-              </a:rPr>
-              <a:t>3) a third that takes in two doubles and a String and sets the height and width  </a:t>
-            </a:r>
-          </a:p>
-          <a:p>
-            <a:r>
-              <a:rPr lang="en-US" dirty="0">
-                <a:solidFill>
-                  <a:srgbClr val="6A9955"/>
-                </a:solidFill>
-                <a:latin typeface="Consolas" panose="020B0609020204030204" pitchFamily="49" charset="0"/>
-              </a:rPr>
-              <a:t>   equal to the doubles, and the color equal to the String. */</a:t>
-            </a:r>
-          </a:p>
-          <a:p>
-            <a:endParaRPr lang="en-US" dirty="0">
-              <a:solidFill>
-                <a:srgbClr val="6A9955"/>
-              </a:solidFill>
-              <a:latin typeface="Consolas" panose="020B0609020204030204" pitchFamily="49" charset="0"/>
-            </a:endParaRPr>
-          </a:p>
-          <a:p>
-            <a:r>
-              <a:rPr lang="en-US" dirty="0">
-                <a:solidFill>
-                  <a:srgbClr val="6A9955"/>
-                </a:solidFill>
-                <a:latin typeface="Consolas" panose="020B0609020204030204" pitchFamily="49" charset="0"/>
-              </a:rPr>
-              <a:t>//It also has 4 methods, </a:t>
-            </a:r>
-            <a:r>
-              <a:rPr lang="en-US" dirty="0" err="1">
-                <a:solidFill>
-                  <a:srgbClr val="6A9955"/>
-                </a:solidFill>
-                <a:latin typeface="Consolas" panose="020B0609020204030204" pitchFamily="49" charset="0"/>
-              </a:rPr>
-              <a:t>getHeight</a:t>
-            </a:r>
-            <a:r>
-              <a:rPr lang="en-US" dirty="0">
-                <a:solidFill>
-                  <a:srgbClr val="6A9955"/>
-                </a:solidFill>
-                <a:latin typeface="Consolas" panose="020B0609020204030204" pitchFamily="49" charset="0"/>
-              </a:rPr>
-              <a:t>(), </a:t>
-            </a:r>
-            <a:r>
-              <a:rPr lang="en-US" dirty="0" err="1">
-                <a:solidFill>
-                  <a:srgbClr val="6A9955"/>
-                </a:solidFill>
-                <a:latin typeface="Consolas" panose="020B0609020204030204" pitchFamily="49" charset="0"/>
-              </a:rPr>
-              <a:t>getWidth</a:t>
-            </a:r>
-            <a:r>
-              <a:rPr lang="en-US" dirty="0">
-                <a:solidFill>
-                  <a:srgbClr val="6A9955"/>
-                </a:solidFill>
-                <a:latin typeface="Consolas" panose="020B0609020204030204" pitchFamily="49" charset="0"/>
-              </a:rPr>
-              <a:t>(), </a:t>
-            </a:r>
-            <a:r>
-              <a:rPr lang="en-US" dirty="0" err="1">
-                <a:solidFill>
-                  <a:srgbClr val="6A9955"/>
-                </a:solidFill>
-                <a:latin typeface="Consolas" panose="020B0609020204030204" pitchFamily="49" charset="0"/>
-              </a:rPr>
-              <a:t>getColor</a:t>
-            </a:r>
-            <a:r>
-              <a:rPr lang="en-US" dirty="0">
-                <a:solidFill>
-                  <a:srgbClr val="6A9955"/>
-                </a:solidFill>
-                <a:latin typeface="Consolas" panose="020B0609020204030204" pitchFamily="49" charset="0"/>
-              </a:rPr>
-              <a:t>(), </a:t>
-            </a:r>
-            <a:r>
-              <a:rPr lang="en-US" dirty="0" err="1">
-                <a:solidFill>
-                  <a:srgbClr val="6A9955"/>
-                </a:solidFill>
-                <a:latin typeface="Consolas" panose="020B0609020204030204" pitchFamily="49" charset="0"/>
-              </a:rPr>
-              <a:t>calculateArea</a:t>
-            </a:r>
-            <a:r>
-              <a:rPr lang="en-US" dirty="0">
-                <a:solidFill>
-                  <a:srgbClr val="6A9955"/>
-                </a:solidFill>
-                <a:latin typeface="Consolas" panose="020B0609020204030204" pitchFamily="49" charset="0"/>
-              </a:rPr>
-              <a:t>()</a:t>
-            </a:r>
-            <a:r>
-              <a:rPr lang="en-US" b="0" dirty="0">
-                <a:solidFill>
-                  <a:srgbClr val="6A9955"/>
-                </a:solidFill>
                 <a:effectLst/>
                 <a:latin typeface="Consolas" panose="020B0609020204030204" pitchFamily="49" charset="0"/>
               </a:rPr>
-              <a:t> </a:t>
+              <a:t> program that includes a method that applies a raise amount of 5% to an employee’s salary when ever it is called: </a:t>
             </a:r>
             <a:br>
               <a:rPr lang="en-US" b="0" dirty="0">
@@ -4566,7 +4603,7 @@
     </p:spTree>
     <p:extLst>
       <p:ext uri="{BB962C8B-B14F-4D97-AF65-F5344CB8AC3E}">
-        <p14:creationId xmlns:p14="http://schemas.microsoft.com/office/powerpoint/2010/main" val="3889025859"/>
+        <p14:creationId xmlns:p14="http://schemas.microsoft.com/office/powerpoint/2010/main" val="3439433472"/>
       </p:ext>
     </p:extLst>
   </p:cSld>
@@ -4652,6 +4689,370 @@
                 <a:cs typeface="Anton"/>
                 <a:sym typeface="Anton"/>
               </a:rPr>
+              <a:t>#5 Coding Warm-Up: </a:t>
+            </a:r>
+            <a:r>
+              <a:rPr lang="en-CA" sz="3200" dirty="0">
+                <a:solidFill>
+                  <a:schemeClr val="hlink"/>
+                </a:solidFill>
+                <a:uFill>
+                  <a:noFill/>
+                </a:uFill>
+              </a:rPr>
+              <a:t>Defining a Class</a:t>
+            </a:r>
+            <a:endParaRPr lang="en-CA" sz="3200" dirty="0">
+              <a:solidFill>
+                <a:schemeClr val="dk1"/>
+              </a:solidFill>
+              <a:latin typeface="Anton"/>
+              <a:ea typeface="Anton"/>
+              <a:cs typeface="Anton"/>
+              <a:sym typeface="Anton"/>
+            </a:endParaRPr>
+          </a:p>
+        </p:txBody>
+      </p:sp>
+      <p:sp>
+        <p:nvSpPr>
+          <p:cNvPr id="3" name="TextBox 2">
+            <a:extLst>
+              <a:ext uri="{FF2B5EF4-FFF2-40B4-BE49-F238E27FC236}">
+                <a16:creationId xmlns:a16="http://schemas.microsoft.com/office/drawing/2014/main" id="{5B10B59A-12F2-A80B-6F60-01FDCAEAAEF7}"/>
+              </a:ext>
+            </a:extLst>
+          </p:cNvPr>
+          <p:cNvSpPr txBox="1"/>
+          <p:nvPr/>
+        </p:nvSpPr>
+        <p:spPr>
+          <a:xfrm>
+            <a:off x="281335" y="1186755"/>
+            <a:ext cx="8297562" cy="2893100"/>
+          </a:xfrm>
+          <a:prstGeom prst="rect">
+            <a:avLst/>
+          </a:prstGeom>
+          <a:noFill/>
+        </p:spPr>
+        <p:txBody>
+          <a:bodyPr wrap="square">
+            <a:spAutoFit/>
+          </a:bodyPr>
+          <a:lstStyle/>
+          <a:p>
+            <a:r>
+              <a:rPr lang="en-US" dirty="0">
+                <a:solidFill>
+                  <a:srgbClr val="6A9955"/>
+                </a:solidFill>
+                <a:latin typeface="Consolas" panose="020B0609020204030204" pitchFamily="49" charset="0"/>
+              </a:rPr>
+              <a:t>//Create a Rectangle class, with attributes height, width, and color.</a:t>
+            </a:r>
+          </a:p>
+          <a:p>
+            <a:endParaRPr lang="en-US" dirty="0">
+              <a:solidFill>
+                <a:srgbClr val="6A9955"/>
+              </a:solidFill>
+              <a:latin typeface="Consolas" panose="020B0609020204030204" pitchFamily="49" charset="0"/>
+            </a:endParaRPr>
+          </a:p>
+          <a:p>
+            <a:r>
+              <a:rPr lang="en-US" dirty="0">
+                <a:solidFill>
+                  <a:srgbClr val="6A9955"/>
+                </a:solidFill>
+                <a:latin typeface="Consolas" panose="020B0609020204030204" pitchFamily="49" charset="0"/>
+              </a:rPr>
+              <a:t>/* It has 3 constructors: </a:t>
+            </a:r>
+          </a:p>
+          <a:p>
+            <a:r>
+              <a:rPr lang="en-US" dirty="0">
+                <a:solidFill>
+                  <a:srgbClr val="6A9955"/>
+                </a:solidFill>
+                <a:latin typeface="Consolas" panose="020B0609020204030204" pitchFamily="49" charset="0"/>
+              </a:rPr>
+              <a:t>1) one that takes in no information and sets the height, width, and color to 1.0,         </a:t>
+            </a:r>
+          </a:p>
+          <a:p>
+            <a:r>
+              <a:rPr lang="en-US" dirty="0">
+                <a:solidFill>
+                  <a:srgbClr val="6A9955"/>
+                </a:solidFill>
+                <a:latin typeface="Consolas" panose="020B0609020204030204" pitchFamily="49" charset="0"/>
+              </a:rPr>
+              <a:t>   2.0, and “red”</a:t>
+            </a:r>
+          </a:p>
+          <a:p>
+            <a:r>
+              <a:rPr lang="en-US" dirty="0">
+                <a:solidFill>
+                  <a:srgbClr val="6A9955"/>
+                </a:solidFill>
+                <a:latin typeface="Consolas" panose="020B0609020204030204" pitchFamily="49" charset="0"/>
+              </a:rPr>
+              <a:t>2) a second that takes in two doubles, and sets the height equal to the first  </a:t>
+            </a:r>
+          </a:p>
+          <a:p>
+            <a:r>
+              <a:rPr lang="en-US" dirty="0">
+                <a:solidFill>
+                  <a:srgbClr val="6A9955"/>
+                </a:solidFill>
+                <a:latin typeface="Consolas" panose="020B0609020204030204" pitchFamily="49" charset="0"/>
+              </a:rPr>
+              <a:t>   double, the width equal to the second double, and the color equal to “none”</a:t>
+            </a:r>
+          </a:p>
+          <a:p>
+            <a:endParaRPr lang="en-US" dirty="0">
+              <a:solidFill>
+                <a:srgbClr val="6A9955"/>
+              </a:solidFill>
+              <a:latin typeface="Consolas" panose="020B0609020204030204" pitchFamily="49" charset="0"/>
+            </a:endParaRPr>
+          </a:p>
+          <a:p>
+            <a:r>
+              <a:rPr lang="en-US" dirty="0">
+                <a:solidFill>
+                  <a:srgbClr val="6A9955"/>
+                </a:solidFill>
+                <a:latin typeface="Consolas" panose="020B0609020204030204" pitchFamily="49" charset="0"/>
+              </a:rPr>
+              <a:t>3) a third that takes in two doubles and a String and sets the height and width  </a:t>
+            </a:r>
+          </a:p>
+          <a:p>
+            <a:r>
+              <a:rPr lang="en-US" dirty="0">
+                <a:solidFill>
+                  <a:srgbClr val="6A9955"/>
+                </a:solidFill>
+                <a:latin typeface="Consolas" panose="020B0609020204030204" pitchFamily="49" charset="0"/>
+              </a:rPr>
+              <a:t>   equal to the doubles, and the color equal to the String. */</a:t>
+            </a:r>
+          </a:p>
+          <a:p>
+            <a:endParaRPr lang="en-US" dirty="0">
+              <a:solidFill>
+                <a:srgbClr val="6A9955"/>
+              </a:solidFill>
+              <a:latin typeface="Consolas" panose="020B0609020204030204" pitchFamily="49" charset="0"/>
+            </a:endParaRPr>
+          </a:p>
+          <a:p>
+            <a:r>
+              <a:rPr lang="en-US" dirty="0">
+                <a:solidFill>
+                  <a:srgbClr val="6A9955"/>
+                </a:solidFill>
+                <a:latin typeface="Consolas" panose="020B0609020204030204" pitchFamily="49" charset="0"/>
+              </a:rPr>
+              <a:t>//It also has 4 methods, </a:t>
+            </a:r>
+            <a:r>
+              <a:rPr lang="en-US" dirty="0" err="1">
+                <a:solidFill>
+                  <a:srgbClr val="6A9955"/>
+                </a:solidFill>
+                <a:latin typeface="Consolas" panose="020B0609020204030204" pitchFamily="49" charset="0"/>
+              </a:rPr>
+              <a:t>getHeight</a:t>
+            </a:r>
+            <a:r>
+              <a:rPr lang="en-US" dirty="0">
+                <a:solidFill>
+                  <a:srgbClr val="6A9955"/>
+                </a:solidFill>
+                <a:latin typeface="Consolas" panose="020B0609020204030204" pitchFamily="49" charset="0"/>
+              </a:rPr>
+              <a:t>(), </a:t>
+            </a:r>
+            <a:r>
+              <a:rPr lang="en-US" dirty="0" err="1">
+                <a:solidFill>
+                  <a:srgbClr val="6A9955"/>
+                </a:solidFill>
+                <a:latin typeface="Consolas" panose="020B0609020204030204" pitchFamily="49" charset="0"/>
+              </a:rPr>
+              <a:t>getWidth</a:t>
+            </a:r>
+            <a:r>
+              <a:rPr lang="en-US" dirty="0">
+                <a:solidFill>
+                  <a:srgbClr val="6A9955"/>
+                </a:solidFill>
+                <a:latin typeface="Consolas" panose="020B0609020204030204" pitchFamily="49" charset="0"/>
+              </a:rPr>
+              <a:t>(), </a:t>
+            </a:r>
+            <a:r>
+              <a:rPr lang="en-US" dirty="0" err="1">
+                <a:solidFill>
+                  <a:srgbClr val="6A9955"/>
+                </a:solidFill>
+                <a:latin typeface="Consolas" panose="020B0609020204030204" pitchFamily="49" charset="0"/>
+              </a:rPr>
+              <a:t>getColor</a:t>
+            </a:r>
+            <a:r>
+              <a:rPr lang="en-US" dirty="0">
+                <a:solidFill>
+                  <a:srgbClr val="6A9955"/>
+                </a:solidFill>
+                <a:latin typeface="Consolas" panose="020B0609020204030204" pitchFamily="49" charset="0"/>
+              </a:rPr>
+              <a:t>(), </a:t>
+            </a:r>
+            <a:r>
+              <a:rPr lang="en-US" dirty="0" err="1">
+                <a:solidFill>
+                  <a:srgbClr val="6A9955"/>
+                </a:solidFill>
+                <a:latin typeface="Consolas" panose="020B0609020204030204" pitchFamily="49" charset="0"/>
+              </a:rPr>
+              <a:t>calculateArea</a:t>
+            </a:r>
+            <a:r>
+              <a:rPr lang="en-US" dirty="0">
+                <a:solidFill>
+                  <a:srgbClr val="6A9955"/>
+                </a:solidFill>
+                <a:latin typeface="Consolas" panose="020B0609020204030204" pitchFamily="49" charset="0"/>
+              </a:rPr>
+              <a:t>()</a:t>
+            </a:r>
+            <a:r>
+              <a:rPr lang="en-US" b="0" dirty="0">
+                <a:solidFill>
+                  <a:srgbClr val="6A9955"/>
+                </a:solidFill>
+                <a:effectLst/>
+                <a:latin typeface="Consolas" panose="020B0609020204030204" pitchFamily="49" charset="0"/>
+              </a:rPr>
+              <a:t> </a:t>
+            </a:r>
+            <a:br>
+              <a:rPr lang="en-US" b="0" dirty="0">
+                <a:solidFill>
+                  <a:srgbClr val="CCCCCC"/>
+                </a:solidFill>
+                <a:effectLst/>
+                <a:latin typeface="Consolas" panose="020B0609020204030204" pitchFamily="49" charset="0"/>
+              </a:rPr>
+            </a:br>
+            <a:endParaRPr lang="en-US" b="0" dirty="0">
+              <a:solidFill>
+                <a:srgbClr val="CCCCCC"/>
+              </a:solidFill>
+              <a:effectLst/>
+              <a:latin typeface="Consolas" panose="020B0609020204030204" pitchFamily="49" charset="0"/>
+            </a:endParaRPr>
+          </a:p>
+        </p:txBody>
+      </p:sp>
+    </p:spTree>
+    <p:extLst>
+      <p:ext uri="{BB962C8B-B14F-4D97-AF65-F5344CB8AC3E}">
+        <p14:creationId xmlns:p14="http://schemas.microsoft.com/office/powerpoint/2010/main" val="3889025859"/>
+      </p:ext>
+    </p:extLst>
+  </p:cSld>
+  <p:clrMapOvr>
+    <a:masterClrMapping/>
+  </p:clrMapOvr>
+</p:sld>
+</file>
+
+<file path=ppt/slides/slide8.xml><?xml version="1.0" encoding="utf-8"?>
+<p:sld xmlns:a="http://schemas.openxmlformats.org/drawingml/2006/main" xmlns:r="http://schemas.openxmlformats.org/officeDocument/2006/relationships" xmlns:p="http://schemas.openxmlformats.org/presentationml/2006/main">
+  <p:cSld>
+    <p:spTree>
+      <p:nvGrpSpPr>
+        <p:cNvPr id="1" name="">
+          <a:extLst>
+            <a:ext uri="{FF2B5EF4-FFF2-40B4-BE49-F238E27FC236}">
+              <a16:creationId xmlns:a16="http://schemas.microsoft.com/office/drawing/2014/main" id="{20C4F288-83AD-0D31-A821-90A8774C717C}"/>
+            </a:ext>
+          </a:extLst>
+        </p:cNvPr>
+        <p:cNvGrpSpPr/>
+        <p:nvPr/>
+      </p:nvGrpSpPr>
+      <p:grpSpPr>
+        <a:xfrm>
+          <a:off x="0" y="0"/>
+          <a:ext cx="0" cy="0"/>
+          <a:chOff x="0" y="0"/>
+          <a:chExt cx="0" cy="0"/>
+        </a:xfrm>
+      </p:grpSpPr>
+      <p:sp>
+        <p:nvSpPr>
+          <p:cNvPr id="2" name="Google Shape;877;p41">
+            <a:extLst>
+              <a:ext uri="{FF2B5EF4-FFF2-40B4-BE49-F238E27FC236}">
+                <a16:creationId xmlns:a16="http://schemas.microsoft.com/office/drawing/2014/main" id="{A5EAC2C4-B54C-99F1-0D3A-896E01EADD6F}"/>
+              </a:ext>
+            </a:extLst>
+          </p:cNvPr>
+          <p:cNvSpPr txBox="1">
+            <a:spLocks noGrp="1"/>
+          </p:cNvSpPr>
+          <p:nvPr>
+            <p:ph type="title"/>
+          </p:nvPr>
+        </p:nvSpPr>
+        <p:spPr>
+          <a:xfrm>
+            <a:off x="281335" y="383241"/>
+            <a:ext cx="7704000" cy="572700"/>
+          </a:xfrm>
+          <a:prstGeom prst="rect">
+            <a:avLst/>
+          </a:prstGeom>
+        </p:spPr>
+        <p:txBody>
+          <a:bodyPr spcFirstLastPara="1" wrap="square" lIns="91425" tIns="91425" rIns="91425" bIns="91425" anchor="t" anchorCtr="0">
+            <a:noAutofit/>
+          </a:bodyPr>
+          <a:lstStyle/>
+          <a:p>
+            <a:pPr marL="0" lvl="0" indent="0" rtl="0">
+              <a:spcBef>
+                <a:spcPts val="0"/>
+              </a:spcBef>
+              <a:spcAft>
+                <a:spcPts val="0"/>
+              </a:spcAft>
+              <a:buNone/>
+            </a:pPr>
+            <a:r>
+              <a:rPr lang="en-CA" sz="3200" dirty="0">
+                <a:solidFill>
+                  <a:schemeClr val="hlink"/>
+                </a:solidFill>
+                <a:uFill>
+                  <a:noFill/>
+                </a:uFill>
+                <a:latin typeface="Anton"/>
+                <a:ea typeface="Anton"/>
+                <a:cs typeface="Anton"/>
+                <a:sym typeface="Anton"/>
+              </a:rPr>
               <a:t>#6 Coding Warm-Up: </a:t>
             </a:r>
             <a:r>
@@ -5174,7 +5575,7 @@
 </p:sld>
 </file>
 
-<file path=ppt/slides/slide8.xml><?xml version="1.0" encoding="utf-8"?>
+<file path=ppt/slides/slide9.xml><?xml version="1.0" encoding="utf-8"?>
 <p:sld xmlns:a="http://schemas.openxmlformats.org/drawingml/2006/main" xmlns:r="http://schemas.openxmlformats.org/officeDocument/2006/relationships" xmlns:p="http://schemas.openxmlformats.org/presentationml/2006/main">
   <p:cSld>
     <p:spTree>
@@ -5261,7 +5662,7 @@
                   <a:noFill/>
                 </a:uFill>
               </a:rPr>
-              <a:t>Class Inheritance Advanced</a:t>
+              <a:t>Class Inheritance </a:t>
             </a:r>
             <a:endParaRPr lang="en-CA" sz="3200" dirty="0">
               <a:solidFill>

</xml_diff>